<commit_message>
updated over process diagram image with updated font size
</commit_message>
<xml_diff>
--- a/docs/presentations/openMDR_caBIGAnnualMeeting2009.pptx
+++ b/docs/presentations/openMDR_caBIGAnnualMeeting2009.pptx
@@ -2452,21 +2452,8 @@
             </a:r>
             <a:r>
               <a:rPr lang="en-US" sz="4000" dirty="0" smtClean="0"/>
-              <a:t> and SIW</a:t>
-            </a:r>
-            <a:r>
-              <a:rPr lang="en-US" sz="4000" dirty="0" smtClean="0"/>
-              <a:t> tools in </a:t>
-            </a:r>
-            <a:r>
-              <a:rPr lang="en-US" sz="4000" dirty="0" smtClean="0"/>
-              <a:t>order to create semantically annotated grid </a:t>
-            </a:r>
-            <a:r>
-              <a:rPr lang="en-US" sz="4000" dirty="0" smtClean="0"/>
-              <a:t>services.</a:t>
-            </a:r>
-            <a:endParaRPr lang="en-US" sz="4000" dirty="0" smtClean="0"/>
+              <a:t> and SIW tools in order to create semantically annotated grid services.</a:t>
+            </a:r>
           </a:p>
         </p:txBody>
       </p:sp>
@@ -2509,11 +2496,7 @@
             </a:pPr>
             <a:r>
               <a:rPr lang="en-US" sz="4000" dirty="0" smtClean="0"/>
-              <a:t>Makes </a:t>
-            </a:r>
-            <a:r>
-              <a:rPr lang="en-US" sz="4000" dirty="0" smtClean="0"/>
-              <a:t>use of the federated semantic metadata management platform provided by the UK </a:t>
+              <a:t>Makes use of the federated semantic metadata management platform provided by the UK </a:t>
             </a:r>
             <a:r>
               <a:rPr lang="en-US" sz="4000" dirty="0" err="1" smtClean="0"/>
@@ -2531,7 +2514,6 @@
               <a:rPr lang="en-US" sz="4000" dirty="0" smtClean="0"/>
               <a:t> project, which provides a lightweight ISO 11179 standards compliant metadata repository. </a:t>
             </a:r>
-            <a:endParaRPr lang="en-US" sz="4000" dirty="0" smtClean="0"/>
           </a:p>
           <a:p>
             <a:pPr marL="453090" indent="-453090" algn="just">
@@ -2543,11 +2525,7 @@
             </a:pPr>
             <a:r>
               <a:rPr lang="en-US" sz="4000" dirty="0" smtClean="0"/>
-              <a:t>Makes use </a:t>
-            </a:r>
-            <a:r>
-              <a:rPr lang="en-US" sz="4000" dirty="0" smtClean="0"/>
-              <a:t>of tools that enable semantic annotation from its own metadata repository, and can also resolve metadata and terminologies from remote resources </a:t>
+              <a:t>Makes use of tools that enable semantic annotation from its own metadata repository, and can also resolve metadata and terminologies from remote resources </a:t>
             </a:r>
           </a:p>
           <a:p>
@@ -2560,11 +2538,7 @@
             </a:pPr>
             <a:r>
               <a:rPr lang="en-US" sz="4000" dirty="0" smtClean="0"/>
-              <a:t>Provides </a:t>
-            </a:r>
-            <a:r>
-              <a:rPr lang="en-US" sz="4000" dirty="0" smtClean="0"/>
-              <a:t>choice to groups for managing semantic metadata and also give them the ability to create </a:t>
+              <a:t>Provides choice to groups for managing semantic metadata and also give them the ability to create </a:t>
             </a:r>
             <a:r>
               <a:rPr lang="en-US" sz="4000" dirty="0" err="1" smtClean="0"/>
@@ -2585,27 +2559,7 @@
             </a:pPr>
             <a:r>
               <a:rPr lang="en-US" sz="4000" dirty="0" smtClean="0"/>
-              <a:t>Provides for user groups that</a:t>
-            </a:r>
-            <a:r>
-              <a:rPr lang="en-US" sz="4000" dirty="0" smtClean="0"/>
-              <a:t> want to create a non authoritative metadata resource during </a:t>
-            </a:r>
-            <a:r>
-              <a:rPr lang="en-US" sz="4000" dirty="0" smtClean="0"/>
-              <a:t>development and do not </a:t>
-            </a:r>
-            <a:r>
-              <a:rPr lang="en-US" sz="4000" dirty="0" smtClean="0"/>
-              <a:t>want</a:t>
-            </a:r>
-            <a:r>
-              <a:rPr lang="en-US" sz="4000" dirty="0" smtClean="0"/>
-              <a:t> to </a:t>
-            </a:r>
-            <a:r>
-              <a:rPr lang="en-US" sz="4000" dirty="0" smtClean="0"/>
-              <a:t>use the NCI </a:t>
+              <a:t>Provides for user groups that want to create a non authoritative metadata resource during development and do not want to use the NCI </a:t>
             </a:r>
             <a:r>
               <a:rPr lang="en-US" sz="4000" dirty="0" err="1" smtClean="0"/>
@@ -2615,7 +2569,6 @@
               <a:rPr lang="en-US" sz="4000" dirty="0" smtClean="0"/>
               <a:t>.</a:t>
             </a:r>
-            <a:endParaRPr lang="en-US" sz="4000" dirty="0" smtClean="0"/>
           </a:p>
         </p:txBody>
       </p:sp>
@@ -2697,21 +2650,7 @@
                 <a:ea typeface="ＭＳ Ｐゴシック" pitchFamily="-109" charset="-128"/>
                 <a:cs typeface="ＭＳ Ｐゴシック" pitchFamily="-109" charset="-128"/>
               </a:rPr>
-              <a:t> not </a:t>
-            </a:r>
-            <a:r>
-              <a:rPr lang="en-US" sz="4000" kern="0" dirty="0" smtClean="0">
-                <a:ea typeface="ＭＳ Ｐゴシック" pitchFamily="-109" charset="-128"/>
-                <a:cs typeface="ＭＳ Ｐゴシック" pitchFamily="-109" charset="-128"/>
-              </a:rPr>
-              <a:t>intended to</a:t>
-            </a:r>
-            <a:r>
-              <a:rPr lang="en-US" sz="4000" kern="0" dirty="0" smtClean="0">
-                <a:ea typeface="ＭＳ Ｐゴシック" pitchFamily="-109" charset="-128"/>
-                <a:cs typeface="ＭＳ Ｐゴシック" pitchFamily="-109" charset="-128"/>
-              </a:rPr>
-              <a:t> be setup locally.</a:t>
+              <a:t> not intended to be setup locally.</a:t>
             </a:r>
           </a:p>
           <a:p>
@@ -2768,42 +2707,7 @@
                 <a:ea typeface="ＭＳ Ｐゴシック" pitchFamily="-109" charset="-128"/>
                 <a:cs typeface="ＭＳ Ｐゴシック" pitchFamily="-109" charset="-128"/>
               </a:rPr>
-              <a:t>Semantic Integration Workbench</a:t>
-            </a:r>
-            <a:r>
-              <a:rPr lang="en-US" sz="4000" kern="0" dirty="0" smtClean="0">
-                <a:ea typeface="ＭＳ Ｐゴシック" pitchFamily="-109" charset="-128"/>
-                <a:cs typeface="ＭＳ Ｐゴシック" pitchFamily="-109" charset="-128"/>
-              </a:rPr>
-              <a:t> (SIW) </a:t>
-            </a:r>
-            <a:r>
-              <a:rPr lang="en-US" sz="4000" kern="0" dirty="0" smtClean="0">
-                <a:ea typeface="ＭＳ Ｐゴシック" pitchFamily="-109" charset="-128"/>
-                <a:cs typeface="ＭＳ Ｐゴシック" pitchFamily="-109" charset="-128"/>
-              </a:rPr>
-              <a:t>cannot </a:t>
-            </a:r>
-            <a:r>
-              <a:rPr lang="en-US" sz="4000" kern="0" dirty="0" smtClean="0">
-                <a:ea typeface="ＭＳ Ｐゴシック" pitchFamily="-109" charset="-128"/>
-                <a:cs typeface="ＭＳ Ｐゴシック" pitchFamily="-109" charset="-128"/>
-              </a:rPr>
-              <a:t>annotate</a:t>
-            </a:r>
-            <a:r>
-              <a:rPr lang="en-US" sz="4000" kern="0" dirty="0" smtClean="0">
-                <a:ea typeface="ＭＳ Ｐゴシック" pitchFamily="-109" charset="-128"/>
-                <a:cs typeface="ＭＳ Ｐゴシック" pitchFamily="-109" charset="-128"/>
-              </a:rPr>
-              <a:t> </a:t>
-            </a:r>
-            <a:r>
-              <a:rPr lang="en-US" sz="4000" kern="0" dirty="0" smtClean="0">
-                <a:ea typeface="ＭＳ Ｐゴシック" pitchFamily="-109" charset="-128"/>
-                <a:cs typeface="ＭＳ Ｐゴシック" pitchFamily="-109" charset="-128"/>
-              </a:rPr>
-              <a:t>and </a:t>
+              <a:t>Semantic Integration Workbench (SIW) cannot annotate and </a:t>
             </a:r>
             <a:r>
               <a:rPr lang="en-US" sz="4000" kern="0" dirty="0" err="1" smtClean="0">
@@ -2817,26 +2721,8 @@
                 <a:ea typeface="ＭＳ Ｐゴシック" pitchFamily="-109" charset="-128"/>
                 <a:cs typeface="ＭＳ Ｐゴシック" pitchFamily="-109" charset="-128"/>
               </a:rPr>
-              <a:t> cannot</a:t>
-            </a:r>
-            <a:r>
-              <a:rPr lang="en-US" sz="4000" kern="0" dirty="0" smtClean="0">
-                <a:ea typeface="ＭＳ Ｐゴシック" pitchFamily="-109" charset="-128"/>
-                <a:cs typeface="ＭＳ Ｐゴシック" pitchFamily="-109" charset="-128"/>
-              </a:rPr>
-              <a:t> </a:t>
-            </a:r>
-            <a:r>
-              <a:rPr lang="en-US" sz="4000" kern="0" dirty="0" smtClean="0">
-                <a:ea typeface="ＭＳ Ｐゴシック" pitchFamily="-109" charset="-128"/>
-                <a:cs typeface="ＭＳ Ｐゴシック" pitchFamily="-109" charset="-128"/>
-              </a:rPr>
-              <a:t>store a model that is annotated by more that one metadata registry</a:t>
-            </a:r>
-            <a:endParaRPr lang="en-US" sz="4000" kern="0" dirty="0" smtClean="0">
-              <a:ea typeface="ＭＳ Ｐゴシック" pitchFamily="-109" charset="-128"/>
-              <a:cs typeface="ＭＳ Ｐゴシック" pitchFamily="-109" charset="-128"/>
-            </a:endParaRPr>
+              <a:t> cannot store a model that is annotated by more that one metadata registry</a:t>
+            </a:r>
           </a:p>
           <a:p>
             <a:pPr marL="453090" indent="-453090" algn="just">
@@ -2858,28 +2744,7 @@
                 <a:ea typeface="ＭＳ Ｐゴシック" pitchFamily="-109" charset="-128"/>
                 <a:cs typeface="ＭＳ Ｐゴシック" pitchFamily="-109" charset="-128"/>
               </a:rPr>
-              <a:t> </a:t>
-            </a:r>
-            <a:r>
-              <a:rPr lang="en-US" sz="4000" kern="0" dirty="0" smtClean="0">
-                <a:ea typeface="ＭＳ Ｐゴシック" pitchFamily="-109" charset="-128"/>
-                <a:cs typeface="ＭＳ Ｐゴシック" pitchFamily="-109" charset="-128"/>
-              </a:rPr>
-              <a:t>tools currently can only create grid data services that use models which have gone through the</a:t>
-            </a:r>
-            <a:r>
-              <a:rPr lang="en-US" sz="4000" kern="0" dirty="0" smtClean="0">
-                <a:ea typeface="ＭＳ Ｐゴシック" pitchFamily="-109" charset="-128"/>
-                <a:cs typeface="ＭＳ Ｐゴシック" pitchFamily="-109" charset="-128"/>
-              </a:rPr>
-              <a:t> (</a:t>
-            </a:r>
-            <a:r>
-              <a:rPr lang="en-US" sz="4000" kern="0" dirty="0" smtClean="0">
-                <a:ea typeface="ＭＳ Ｐゴシック" pitchFamily="-109" charset="-128"/>
-                <a:cs typeface="ＭＳ Ｐゴシック" pitchFamily="-109" charset="-128"/>
-              </a:rPr>
-              <a:t>SIW), which makes current use of NCI source of metadata approach inevitable.</a:t>
+              <a:t> tools currently can only create grid data services that use models which have gone through the (SIW), which makes current use of NCI source of metadata approach inevitable.</a:t>
             </a:r>
             <a:endParaRPr lang="en-US" sz="2800" kern="0" dirty="0" smtClean="0">
               <a:ea typeface="ＭＳ Ｐゴシック" pitchFamily="-109" charset="-128"/>
@@ -3047,15 +2912,7 @@
             </a:pPr>
             <a:r>
               <a:rPr lang="en-US" sz="4000" b="1" dirty="0" smtClean="0"/>
-              <a:t>MDR </a:t>
-            </a:r>
-            <a:r>
-              <a:rPr lang="en-US" sz="4000" b="1" dirty="0" smtClean="0"/>
-              <a:t>Core - ISO11179 </a:t>
-            </a:r>
-            <a:r>
-              <a:rPr lang="en-US" sz="4000" b="1" dirty="0" smtClean="0"/>
-              <a:t>Database</a:t>
+              <a:t>MDR Core - ISO11179 Database</a:t>
             </a:r>
           </a:p>
           <a:p>
@@ -3076,13 +2933,8 @@
             </a:r>
             <a:r>
               <a:rPr lang="en-US" sz="4000" dirty="0" smtClean="0"/>
-              <a:t> iso11179 database</a:t>
-            </a:r>
-            <a:r>
-              <a:rPr lang="en-US" sz="4000" dirty="0" smtClean="0"/>
-              <a:t>.</a:t>
-            </a:r>
-            <a:endParaRPr lang="en-US" sz="4000" dirty="0" smtClean="0"/>
+              <a:t> iso11179 database.</a:t>
+            </a:r>
           </a:p>
           <a:p>
             <a:pPr marL="3659188" lvl="2" indent="-452438" algn="just">
@@ -3094,15 +2946,7 @@
             </a:pPr>
             <a:r>
               <a:rPr lang="en-US" sz="4000" dirty="0" smtClean="0"/>
-              <a:t>Built </a:t>
-            </a:r>
-            <a:r>
-              <a:rPr lang="en-US" sz="4000" dirty="0" smtClean="0"/>
-              <a:t>on</a:t>
-            </a:r>
-            <a:r>
-              <a:rPr lang="en-US" sz="4000" dirty="0" smtClean="0"/>
-              <a:t> </a:t>
+              <a:t>Built on </a:t>
             </a:r>
             <a:r>
               <a:rPr lang="en-US" sz="4000" i="1" dirty="0" smtClean="0"/>
@@ -3165,11 +3009,7 @@
             </a:r>
             <a:r>
               <a:rPr lang="en-US" sz="4000" dirty="0" smtClean="0"/>
-              <a:t> semantic metadata</a:t>
-            </a:r>
-            <a:r>
-              <a:rPr lang="en-US" sz="4000" dirty="0" smtClean="0"/>
-              <a:t>.</a:t>
+              <a:t> semantic metadata.</a:t>
             </a:r>
           </a:p>
           <a:p>
@@ -3184,15 +3024,7 @@
             </a:r>
             <a:r>
               <a:rPr lang="en-US" sz="4000" dirty="0" smtClean="0"/>
-              <a:t> -</a:t>
-            </a:r>
-            <a:r>
-              <a:rPr lang="en-US" sz="4000" dirty="0" smtClean="0"/>
-              <a:t> API </a:t>
-            </a:r>
-            <a:r>
-              <a:rPr lang="en-US" sz="4000" dirty="0" smtClean="0"/>
-              <a:t>and Grid Service for querying across many disparate semantic metadata repositories and using the information for data model annotation.</a:t>
+              <a:t> - API and Grid Service for querying across many disparate semantic metadata repositories and using the information for data model annotation.</a:t>
             </a:r>
           </a:p>
           <a:p>
@@ -3209,15 +3041,7 @@
             </a:r>
             <a:r>
               <a:rPr lang="en-US" sz="4000" dirty="0" smtClean="0"/>
-              <a:t> grid service</a:t>
-            </a:r>
-            <a:r>
-              <a:rPr lang="en-US" sz="4000" dirty="0" smtClean="0"/>
-              <a:t> - capable </a:t>
-            </a:r>
-            <a:r>
-              <a:rPr lang="en-US" sz="4000" dirty="0" smtClean="0"/>
-              <a:t>of talking to </a:t>
+              <a:t> grid service - capable of talking to </a:t>
             </a:r>
             <a:r>
               <a:rPr lang="en-US" sz="4000" dirty="0" err="1" smtClean="0"/>
@@ -3241,29 +3065,8 @@
             </a:r>
             <a:r>
               <a:rPr lang="en-US" sz="4000" dirty="0" smtClean="0"/>
-              <a:t> systems enabling federated query of common data elements</a:t>
-            </a:r>
-            <a:r>
-              <a:rPr lang="en-US" sz="4000" dirty="0" smtClean="0"/>
-              <a:t> </a:t>
-            </a:r>
-            <a:r>
-              <a:rPr lang="en-US" sz="4000" dirty="0" smtClean="0"/>
-              <a:t>and</a:t>
-            </a:r>
-            <a:r>
-              <a:rPr lang="en-US" sz="4000" dirty="0" smtClean="0"/>
-              <a:t> </a:t>
-            </a:r>
-            <a:r>
-              <a:rPr lang="en-US" sz="4000" dirty="0" smtClean="0"/>
-              <a:t>concepts</a:t>
-            </a:r>
-            <a:r>
-              <a:rPr lang="en-US" sz="4000" dirty="0" smtClean="0"/>
-              <a:t>.</a:t>
-            </a:r>
-            <a:endParaRPr lang="en-US" sz="4000" dirty="0" smtClean="0"/>
+              <a:t> systems enabling federated query of common data elements and concepts.</a:t>
+            </a:r>
           </a:p>
           <a:p>
             <a:pPr marL="3646488" lvl="2" indent="-452438" algn="just">
@@ -3275,11 +3078,7 @@
             </a:pPr>
             <a:r>
               <a:rPr lang="en-US" sz="4000" dirty="0" smtClean="0"/>
-              <a:t>Enhances </a:t>
-            </a:r>
-            <a:r>
-              <a:rPr lang="en-US" sz="4000" dirty="0" smtClean="0"/>
-              <a:t>and wraps the </a:t>
+              <a:t>Enhances and wraps the </a:t>
             </a:r>
             <a:r>
               <a:rPr lang="en-US" sz="4000" dirty="0" err="1" smtClean="0"/>
@@ -3295,11 +3094,7 @@
             </a:r>
             <a:r>
               <a:rPr lang="en-US" sz="4000" dirty="0" smtClean="0"/>
-              <a:t> in order to parse the received information into a common format</a:t>
-            </a:r>
-            <a:r>
-              <a:rPr lang="en-US" sz="4000" dirty="0" smtClean="0"/>
-              <a:t>.</a:t>
+              <a:t> in order to parse the received information into a common format.</a:t>
             </a:r>
           </a:p>
           <a:p>
@@ -3316,19 +3111,7 @@
             </a:r>
             <a:r>
               <a:rPr lang="en-US" sz="4000" dirty="0" smtClean="0"/>
-              <a:t> </a:t>
-            </a:r>
-            <a:r>
-              <a:rPr lang="en-US" sz="4000" dirty="0" smtClean="0"/>
-              <a:t>service enables it to be deployed in any local or production grid environment and</a:t>
-            </a:r>
-            <a:r>
-              <a:rPr lang="en-US" sz="4000" dirty="0" smtClean="0"/>
-              <a:t> can be configured </a:t>
-            </a:r>
-            <a:r>
-              <a:rPr lang="en-US" sz="4000" dirty="0" smtClean="0"/>
-              <a:t>and modified to talk to many semantic metadata systems.</a:t>
+              <a:t> service enables it to be deployed in any local or production grid environment and can be configured and modified to talk to many semantic metadata systems.</a:t>
             </a:r>
           </a:p>
         </p:txBody>
@@ -3430,31 +3213,7 @@
             </a:r>
             <a:r>
               <a:rPr lang="en-US" sz="4000" dirty="0" smtClean="0"/>
-              <a:t>- A</a:t>
-            </a:r>
-            <a:r>
-              <a:rPr lang="en-US" sz="4000" dirty="0" smtClean="0"/>
-              <a:t> set of </a:t>
-            </a:r>
-            <a:r>
-              <a:rPr lang="en-US" sz="4000" dirty="0" smtClean="0"/>
-              <a:t>tools that can be used in</a:t>
-            </a:r>
-            <a:r>
-              <a:rPr lang="en-US" sz="4000" dirty="0" smtClean="0"/>
-              <a:t> commercial </a:t>
-            </a:r>
-            <a:r>
-              <a:rPr lang="en-US" sz="4000" dirty="0" smtClean="0"/>
-              <a:t>modeling </a:t>
-            </a:r>
-            <a:r>
-              <a:rPr lang="en-US" sz="4000" dirty="0" smtClean="0"/>
-              <a:t>tool such </a:t>
-            </a:r>
-            <a:r>
-              <a:rPr lang="en-US" sz="4000" dirty="0" smtClean="0"/>
-              <a:t>as </a:t>
+              <a:t>- A set of tools that can be used in commercial modeling tool such as </a:t>
             </a:r>
             <a:r>
               <a:rPr lang="en-US" sz="4000" i="1" dirty="0" smtClean="0"/>
@@ -3464,7 +3223,6 @@
               <a:rPr lang="en-US" sz="4000" dirty="0" smtClean="0"/>
               <a:t>, to enable the semantic annotation of federated semantics.</a:t>
             </a:r>
-            <a:endParaRPr lang="en-US" sz="4000" dirty="0" smtClean="0"/>
           </a:p>
           <a:p>
             <a:pPr marL="3646488" lvl="2" indent="-452438" algn="just">
@@ -3484,19 +3242,7 @@
             </a:r>
             <a:r>
               <a:rPr lang="en-US" sz="4000" dirty="0" smtClean="0"/>
-              <a:t> service for locating and utilizing</a:t>
-            </a:r>
-            <a:r>
-              <a:rPr lang="en-US" sz="4000" dirty="0" smtClean="0"/>
-              <a:t> common </a:t>
-            </a:r>
-            <a:r>
-              <a:rPr lang="en-US" sz="4000" dirty="0" smtClean="0"/>
-              <a:t>data </a:t>
-            </a:r>
-            <a:r>
-              <a:rPr lang="en-US" sz="4000" dirty="0" smtClean="0"/>
-              <a:t>elements (</a:t>
+              <a:t> service for locating and utilizing common data elements (</a:t>
             </a:r>
             <a:r>
               <a:rPr lang="en-US" sz="4000" dirty="0" err="1" smtClean="0"/>
@@ -3504,15 +3250,7 @@
             </a:r>
             <a:r>
               <a:rPr lang="en-US" sz="4000" dirty="0" smtClean="0"/>
-              <a:t>) </a:t>
-            </a:r>
-            <a:r>
-              <a:rPr lang="en-US" sz="4000" dirty="0" smtClean="0"/>
-              <a:t>from many semantic metadata sources for annotation of classes and attributes of the logical model</a:t>
-            </a:r>
-            <a:r>
-              <a:rPr lang="en-US" sz="4000" dirty="0" smtClean="0"/>
-              <a:t>.</a:t>
+              <a:t>) from many semantic metadata sources for annotation of classes and attributes of the logical model.</a:t>
             </a:r>
           </a:p>
           <a:p>
@@ -3525,19 +3263,7 @@
             </a:pPr>
             <a:r>
               <a:rPr lang="en-US" sz="4000" dirty="0" smtClean="0"/>
-              <a:t>Tags are created that identify the service and </a:t>
-            </a:r>
-            <a:r>
-              <a:rPr lang="en-US" sz="4000" dirty="0" smtClean="0"/>
-              <a:t>CDE via local </a:t>
-            </a:r>
-            <a:r>
-              <a:rPr lang="en-US" sz="4000" dirty="0" smtClean="0"/>
-              <a:t>unique id to enable more information to be retrieved by a consumer of the model if </a:t>
-            </a:r>
-            <a:r>
-              <a:rPr lang="en-US" sz="4000" dirty="0" smtClean="0"/>
-              <a:t>desired.</a:t>
+              <a:t>Tags are created that identify the service and CDE via local unique id to enable more information to be retrieved by a consumer of the model if desired.</a:t>
             </a:r>
           </a:p>
           <a:p>
@@ -3550,15 +3276,7 @@
             </a:pPr>
             <a:r>
               <a:rPr lang="en-US" sz="4000" dirty="0" smtClean="0"/>
-              <a:t>No </a:t>
-            </a:r>
-            <a:r>
-              <a:rPr lang="en-US" sz="4000" dirty="0" smtClean="0"/>
-              <a:t>need to leave the EA environment</a:t>
-            </a:r>
-            <a:r>
-              <a:rPr lang="en-US" sz="4000" dirty="0" smtClean="0"/>
-              <a:t>.</a:t>
+              <a:t>No need to leave the EA environment.</a:t>
             </a:r>
           </a:p>
           <a:p>
@@ -3581,25 +3299,8 @@
             </a:r>
             <a:r>
               <a:rPr lang="en-US" sz="4000" dirty="0" smtClean="0"/>
-              <a:t> annotated model and create service metadata which will enable the service to be </a:t>
-            </a:r>
-            <a:r>
-              <a:rPr lang="en-US" sz="4000" dirty="0" smtClean="0"/>
-              <a:t>a </a:t>
-            </a:r>
-            <a:r>
-              <a:rPr lang="en-US" sz="4000" dirty="0" smtClean="0"/>
-              <a:t>semantically annotated grid service which can be</a:t>
-            </a:r>
-            <a:r>
-              <a:rPr lang="en-US" sz="4000" dirty="0" smtClean="0"/>
-              <a:t> easily </a:t>
-            </a:r>
-            <a:r>
-              <a:rPr lang="en-US" sz="4000" dirty="0" smtClean="0"/>
-              <a:t>discovered</a:t>
-            </a:r>
-            <a:endParaRPr lang="en-US" sz="4000" dirty="0" smtClean="0"/>
+              <a:t> annotated model and create service metadata which will enable the service to be a semantically annotated grid service which can be easily discovered</a:t>
+            </a:r>
           </a:p>
           <a:p>
             <a:pPr marL="3646488" lvl="1" indent="-452438" algn="just">
@@ -3611,19 +3312,7 @@
             </a:pPr>
             <a:r>
               <a:rPr lang="en-US" sz="4000" dirty="0" smtClean="0"/>
-              <a:t>The </a:t>
-            </a:r>
-            <a:r>
-              <a:rPr lang="en-US" sz="4000" dirty="0" smtClean="0"/>
-              <a:t>metadata can</a:t>
-            </a:r>
-            <a:r>
-              <a:rPr lang="en-US" sz="4000" dirty="0" smtClean="0"/>
-              <a:t> be </a:t>
-            </a:r>
-            <a:r>
-              <a:rPr lang="en-US" sz="4000" dirty="0" smtClean="0"/>
-              <a:t>used to generate a data service using the Introduce Data Service Wizard which prior to this tool would only be able to utilize the </a:t>
+              <a:t>The metadata can be used to generate a data service using the Introduce Data Service Wizard which prior to this tool would only be able to utilize the </a:t>
             </a:r>
             <a:r>
               <a:rPr lang="en-US" sz="4000" dirty="0" err="1" smtClean="0"/>
@@ -3631,11 +3320,7 @@
             </a:r>
             <a:r>
               <a:rPr lang="en-US" sz="4000" dirty="0" smtClean="0"/>
-              <a:t>, </a:t>
-            </a:r>
-            <a:r>
-              <a:rPr lang="en-US" sz="4000" dirty="0" smtClean="0"/>
-              <a:t>can now generate data services annotated with data models from almost anywhere.</a:t>
+              <a:t>, can now generate data services annotated with data models from almost anywhere.</a:t>
             </a:r>
           </a:p>
         </p:txBody>
@@ -3697,7 +3382,7 @@
       </p:sp>
       <p:pic>
         <p:nvPicPr>
-          <p:cNvPr id="29" name="Picture 28"/>
+          <p:cNvPr id="30" name="Picture 29"/>
           <p:cNvPicPr>
             <a:picLocks noChangeAspect="1"/>
           </p:cNvPicPr>
@@ -3705,30 +3390,6 @@
         </p:nvPicPr>
         <p:blipFill>
           <a:blip r:embed="rId7"/>
-          <a:stretch>
-            <a:fillRect/>
-          </a:stretch>
-        </p:blipFill>
-        <p:spPr>
-          <a:xfrm>
-            <a:off x="32613600" y="23393400"/>
-            <a:ext cx="8382000" cy="17485204"/>
-          </a:xfrm>
-          <a:prstGeom prst="rect">
-            <a:avLst/>
-          </a:prstGeom>
-        </p:spPr>
-      </p:pic>
-      <p:pic>
-        <p:nvPicPr>
-          <p:cNvPr id="30" name="Picture 29"/>
-          <p:cNvPicPr>
-            <a:picLocks noChangeAspect="1"/>
-          </p:cNvPicPr>
-          <p:nvPr/>
-        </p:nvPicPr>
-        <p:blipFill>
-          <a:blip r:embed="rId8"/>
           <a:stretch>
             <a:fillRect/>
           </a:stretch>
@@ -3752,7 +3413,7 @@
           <p:nvPr/>
         </p:nvPicPr>
         <p:blipFill>
-          <a:blip r:embed="rId9"/>
+          <a:blip r:embed="rId8"/>
           <a:stretch>
             <a:fillRect/>
           </a:stretch>
@@ -3776,7 +3437,7 @@
           <p:nvPr/>
         </p:nvPicPr>
         <p:blipFill>
-          <a:blip r:embed="rId10"/>
+          <a:blip r:embed="rId9"/>
           <a:stretch>
             <a:fillRect/>
           </a:stretch>
@@ -3800,7 +3461,7 @@
           <p:nvPr/>
         </p:nvPicPr>
         <p:blipFill>
-          <a:blip r:embed="rId11"/>
+          <a:blip r:embed="rId10"/>
           <a:stretch>
             <a:fillRect/>
           </a:stretch>
@@ -3809,6 +3470,30 @@
           <a:xfrm>
             <a:off x="29718000" y="19278600"/>
             <a:ext cx="3886200" cy="3238500"/>
+          </a:xfrm>
+          <a:prstGeom prst="rect">
+            <a:avLst/>
+          </a:prstGeom>
+        </p:spPr>
+      </p:pic>
+      <p:pic>
+        <p:nvPicPr>
+          <p:cNvPr id="25" name="Picture 24"/>
+          <p:cNvPicPr>
+            <a:picLocks noChangeAspect="1"/>
+          </p:cNvPicPr>
+          <p:nvPr/>
+        </p:nvPicPr>
+        <p:blipFill>
+          <a:blip r:embed="rId11"/>
+          <a:stretch>
+            <a:fillRect/>
+          </a:stretch>
+        </p:blipFill>
+        <p:spPr>
+          <a:xfrm>
+            <a:off x="32308800" y="23240999"/>
+            <a:ext cx="8534400" cy="17803117"/>
           </a:xfrm>
           <a:prstGeom prst="rect">
             <a:avLst/>

</xml_diff>